<commit_message>
JavaScript GIT Auto mirar
</commit_message>
<xml_diff>
--- a/Step 08 - JavaScript/Presentación11.pptx
+++ b/Step 08 - JavaScript/Presentación11.pptx
@@ -262,7 +262,7 @@
           <a:p>
             <a:fld id="{92835CAA-DB26-41EB-9DA5-3B4C0531874A}" type="datetimeFigureOut">
               <a:rPr lang="es-ES" smtClean="0"/>
-              <a:t>28/07/2019</a:t>
+              <a:t>29/07/2019</a:t>
             </a:fld>
             <a:endParaRPr lang="es-ES"/>
           </a:p>
@@ -316,7 +316,7 @@
           <a:p>
             <a:fld id="{DDC83CB2-42AF-40B6-96B2-B4A7C6334B86}" type="slidenum">
               <a:rPr lang="es-ES" smtClean="0"/>
-              <a:t>‹Nº›</a:t>
+              <a:t>‹#›</a:t>
             </a:fld>
             <a:endParaRPr lang="es-ES"/>
           </a:p>
@@ -460,7 +460,7 @@
           <a:p>
             <a:fld id="{92835CAA-DB26-41EB-9DA5-3B4C0531874A}" type="datetimeFigureOut">
               <a:rPr lang="es-ES" smtClean="0"/>
-              <a:t>28/07/2019</a:t>
+              <a:t>29/07/2019</a:t>
             </a:fld>
             <a:endParaRPr lang="es-ES"/>
           </a:p>
@@ -514,7 +514,7 @@
           <a:p>
             <a:fld id="{DDC83CB2-42AF-40B6-96B2-B4A7C6334B86}" type="slidenum">
               <a:rPr lang="es-ES" smtClean="0"/>
-              <a:t>‹Nº›</a:t>
+              <a:t>‹#›</a:t>
             </a:fld>
             <a:endParaRPr lang="es-ES"/>
           </a:p>
@@ -668,7 +668,7 @@
           <a:p>
             <a:fld id="{92835CAA-DB26-41EB-9DA5-3B4C0531874A}" type="datetimeFigureOut">
               <a:rPr lang="es-ES" smtClean="0"/>
-              <a:t>28/07/2019</a:t>
+              <a:t>29/07/2019</a:t>
             </a:fld>
             <a:endParaRPr lang="es-ES"/>
           </a:p>
@@ -722,7 +722,7 @@
           <a:p>
             <a:fld id="{DDC83CB2-42AF-40B6-96B2-B4A7C6334B86}" type="slidenum">
               <a:rPr lang="es-ES" smtClean="0"/>
-              <a:t>‹Nº›</a:t>
+              <a:t>‹#›</a:t>
             </a:fld>
             <a:endParaRPr lang="es-ES"/>
           </a:p>
@@ -866,7 +866,7 @@
           <a:p>
             <a:fld id="{92835CAA-DB26-41EB-9DA5-3B4C0531874A}" type="datetimeFigureOut">
               <a:rPr lang="es-ES" smtClean="0"/>
-              <a:t>28/07/2019</a:t>
+              <a:t>29/07/2019</a:t>
             </a:fld>
             <a:endParaRPr lang="es-ES"/>
           </a:p>
@@ -920,7 +920,7 @@
           <a:p>
             <a:fld id="{DDC83CB2-42AF-40B6-96B2-B4A7C6334B86}" type="slidenum">
               <a:rPr lang="es-ES" smtClean="0"/>
-              <a:t>‹Nº›</a:t>
+              <a:t>‹#›</a:t>
             </a:fld>
             <a:endParaRPr lang="es-ES"/>
           </a:p>
@@ -1141,7 +1141,7 @@
           <a:p>
             <a:fld id="{92835CAA-DB26-41EB-9DA5-3B4C0531874A}" type="datetimeFigureOut">
               <a:rPr lang="es-ES" smtClean="0"/>
-              <a:t>28/07/2019</a:t>
+              <a:t>29/07/2019</a:t>
             </a:fld>
             <a:endParaRPr lang="es-ES"/>
           </a:p>
@@ -1195,7 +1195,7 @@
           <a:p>
             <a:fld id="{DDC83CB2-42AF-40B6-96B2-B4A7C6334B86}" type="slidenum">
               <a:rPr lang="es-ES" smtClean="0"/>
-              <a:t>‹Nº›</a:t>
+              <a:t>‹#›</a:t>
             </a:fld>
             <a:endParaRPr lang="es-ES"/>
           </a:p>
@@ -1406,7 +1406,7 @@
           <a:p>
             <a:fld id="{92835CAA-DB26-41EB-9DA5-3B4C0531874A}" type="datetimeFigureOut">
               <a:rPr lang="es-ES" smtClean="0"/>
-              <a:t>28/07/2019</a:t>
+              <a:t>29/07/2019</a:t>
             </a:fld>
             <a:endParaRPr lang="es-ES"/>
           </a:p>
@@ -1460,7 +1460,7 @@
           <a:p>
             <a:fld id="{DDC83CB2-42AF-40B6-96B2-B4A7C6334B86}" type="slidenum">
               <a:rPr lang="es-ES" smtClean="0"/>
-              <a:t>‹Nº›</a:t>
+              <a:t>‹#›</a:t>
             </a:fld>
             <a:endParaRPr lang="es-ES"/>
           </a:p>
@@ -1818,7 +1818,7 @@
           <a:p>
             <a:fld id="{92835CAA-DB26-41EB-9DA5-3B4C0531874A}" type="datetimeFigureOut">
               <a:rPr lang="es-ES" smtClean="0"/>
-              <a:t>28/07/2019</a:t>
+              <a:t>29/07/2019</a:t>
             </a:fld>
             <a:endParaRPr lang="es-ES"/>
           </a:p>
@@ -1872,7 +1872,7 @@
           <a:p>
             <a:fld id="{DDC83CB2-42AF-40B6-96B2-B4A7C6334B86}" type="slidenum">
               <a:rPr lang="es-ES" smtClean="0"/>
-              <a:t>‹Nº›</a:t>
+              <a:t>‹#›</a:t>
             </a:fld>
             <a:endParaRPr lang="es-ES"/>
           </a:p>
@@ -1959,7 +1959,7 @@
           <a:p>
             <a:fld id="{92835CAA-DB26-41EB-9DA5-3B4C0531874A}" type="datetimeFigureOut">
               <a:rPr lang="es-ES" smtClean="0"/>
-              <a:t>28/07/2019</a:t>
+              <a:t>29/07/2019</a:t>
             </a:fld>
             <a:endParaRPr lang="es-ES"/>
           </a:p>
@@ -2013,7 +2013,7 @@
           <a:p>
             <a:fld id="{DDC83CB2-42AF-40B6-96B2-B4A7C6334B86}" type="slidenum">
               <a:rPr lang="es-ES" smtClean="0"/>
-              <a:t>‹Nº›</a:t>
+              <a:t>‹#›</a:t>
             </a:fld>
             <a:endParaRPr lang="es-ES"/>
           </a:p>
@@ -2072,7 +2072,7 @@
           <a:p>
             <a:fld id="{92835CAA-DB26-41EB-9DA5-3B4C0531874A}" type="datetimeFigureOut">
               <a:rPr lang="es-ES" smtClean="0"/>
-              <a:t>28/07/2019</a:t>
+              <a:t>29/07/2019</a:t>
             </a:fld>
             <a:endParaRPr lang="es-ES"/>
           </a:p>
@@ -2126,7 +2126,7 @@
           <a:p>
             <a:fld id="{DDC83CB2-42AF-40B6-96B2-B4A7C6334B86}" type="slidenum">
               <a:rPr lang="es-ES" smtClean="0"/>
-              <a:t>‹Nº›</a:t>
+              <a:t>‹#›</a:t>
             </a:fld>
             <a:endParaRPr lang="es-ES"/>
           </a:p>
@@ -2383,7 +2383,7 @@
           <a:p>
             <a:fld id="{92835CAA-DB26-41EB-9DA5-3B4C0531874A}" type="datetimeFigureOut">
               <a:rPr lang="es-ES" smtClean="0"/>
-              <a:t>28/07/2019</a:t>
+              <a:t>29/07/2019</a:t>
             </a:fld>
             <a:endParaRPr lang="es-ES"/>
           </a:p>
@@ -2437,7 +2437,7 @@
           <a:p>
             <a:fld id="{DDC83CB2-42AF-40B6-96B2-B4A7C6334B86}" type="slidenum">
               <a:rPr lang="es-ES" smtClean="0"/>
-              <a:t>‹Nº›</a:t>
+              <a:t>‹#›</a:t>
             </a:fld>
             <a:endParaRPr lang="es-ES"/>
           </a:p>
@@ -2671,7 +2671,7 @@
           <a:p>
             <a:fld id="{92835CAA-DB26-41EB-9DA5-3B4C0531874A}" type="datetimeFigureOut">
               <a:rPr lang="es-ES" smtClean="0"/>
-              <a:t>28/07/2019</a:t>
+              <a:t>29/07/2019</a:t>
             </a:fld>
             <a:endParaRPr lang="es-ES"/>
           </a:p>
@@ -2725,7 +2725,7 @@
           <a:p>
             <a:fld id="{DDC83CB2-42AF-40B6-96B2-B4A7C6334B86}" type="slidenum">
               <a:rPr lang="es-ES" smtClean="0"/>
-              <a:t>‹Nº›</a:t>
+              <a:t>‹#›</a:t>
             </a:fld>
             <a:endParaRPr lang="es-ES"/>
           </a:p>
@@ -2912,7 +2912,7 @@
           <a:p>
             <a:fld id="{92835CAA-DB26-41EB-9DA5-3B4C0531874A}" type="datetimeFigureOut">
               <a:rPr lang="es-ES" smtClean="0"/>
-              <a:t>28/07/2019</a:t>
+              <a:t>29/07/2019</a:t>
             </a:fld>
             <a:endParaRPr lang="es-ES"/>
           </a:p>
@@ -3002,7 +3002,7 @@
           <a:p>
             <a:fld id="{DDC83CB2-42AF-40B6-96B2-B4A7C6334B86}" type="slidenum">
               <a:rPr lang="es-ES" smtClean="0"/>
-              <a:t>‹Nº›</a:t>
+              <a:t>‹#›</a:t>
             </a:fld>
             <a:endParaRPr lang="es-ES"/>
           </a:p>

</xml_diff>